<commit_message>
doc: update 'commandes git pour zou-flow' ppp.
</commit_message>
<xml_diff>
--- a/.Documentation/Commandes git pour zou flow.pptx
+++ b/.Documentation/Commandes git pour zou flow.pptx
@@ -5,7 +5,7 @@
     <p:sldMasterId id="2147483711" r:id="rId1"/>
   </p:sldMasterIdLst>
   <p:notesMasterIdLst>
-    <p:notesMasterId r:id="rId32"/>
+    <p:notesMasterId r:id="rId33"/>
   </p:notesMasterIdLst>
   <p:sldIdLst>
     <p:sldId id="256" r:id="rId2"/>
@@ -32,17 +32,18 @@
     <p:sldId id="288" r:id="rId23"/>
     <p:sldId id="295" r:id="rId24"/>
     <p:sldId id="296" r:id="rId25"/>
-    <p:sldId id="263" r:id="rId26"/>
-    <p:sldId id="262" r:id="rId27"/>
-    <p:sldId id="260" r:id="rId28"/>
-    <p:sldId id="286" r:id="rId29"/>
-    <p:sldId id="261" r:id="rId30"/>
-    <p:sldId id="264" r:id="rId31"/>
+    <p:sldId id="303" r:id="rId26"/>
+    <p:sldId id="263" r:id="rId27"/>
+    <p:sldId id="262" r:id="rId28"/>
+    <p:sldId id="260" r:id="rId29"/>
+    <p:sldId id="286" r:id="rId30"/>
+    <p:sldId id="261" r:id="rId31"/>
+    <p:sldId id="264" r:id="rId32"/>
   </p:sldIdLst>
   <p:sldSz cx="12192000" cy="6858000"/>
   <p:notesSz cx="6858000" cy="9144000"/>
   <p:custShowLst>
-    <p:custShow name="Meeting 5.12" id="0">
+    <p:custShow name="Meeting 5.12.2018" id="0">
       <p:sldLst>
         <p:sld r:id="rId2"/>
         <p:sld r:id="rId3"/>
@@ -57,14 +58,18 @@
         <p:sld r:id="rId12"/>
         <p:sld r:id="rId13"/>
         <p:sld r:id="rId14"/>
+        <p:sld r:id="rId15"/>
         <p:sld r:id="rId16"/>
+        <p:sld r:id="rId17"/>
         <p:sld r:id="rId18"/>
         <p:sld r:id="rId19"/>
+        <p:sld r:id="rId20"/>
         <p:sld r:id="rId21"/>
         <p:sld r:id="rId22"/>
         <p:sld r:id="rId23"/>
         <p:sld r:id="rId24"/>
         <p:sld r:id="rId25"/>
+        <p:sld r:id="rId26"/>
       </p:sldLst>
     </p:custShow>
   </p:custShowLst>
@@ -28368,8 +28373,24 @@
         </p:nvSpPr>
         <p:spPr/>
         <p:txBody>
-          <a:bodyPr/>
+          <a:bodyPr>
+            <a:normAutofit lnSpcReduction="10000"/>
+          </a:bodyPr>
           <a:lstStyle/>
+          <a:p>
+            <a:r>
+              <a:rPr lang="fr-FR" dirty="0"/>
+              <a:t>git </a:t>
+            </a:r>
+            <a:r>
+              <a:rPr lang="fr-FR" dirty="0" err="1"/>
+              <a:t>sclone</a:t>
+            </a:r>
+            <a:r>
+              <a:rPr lang="fr-FR" dirty="0"/>
+              <a:t>	clone un dépôt avec tous ses sous-modules</a:t>
+            </a:r>
+          </a:p>
           <a:p>
             <a:r>
               <a:rPr lang="fr-FR" dirty="0"/>
@@ -28391,6 +28412,30 @@
             </a:r>
           </a:p>
           <a:p>
+            <a:pPr lvl="1"/>
+            <a:r>
+              <a:rPr lang="fr-FR" dirty="0" err="1">
+                <a:latin typeface="Consolas" panose="020B0609020204030204" pitchFamily="49" charset="0"/>
+              </a:rPr>
+              <a:t>cresus</a:t>
+            </a:r>
+            <a:r>
+              <a:rPr lang="fr-FR" dirty="0">
+                <a:latin typeface="Consolas" panose="020B0609020204030204" pitchFamily="49" charset="0"/>
+              </a:rPr>
+              <a:t>-dev&gt; git for git </a:t>
+            </a:r>
+            <a:r>
+              <a:rPr lang="fr-FR" dirty="0" err="1">
+                <a:latin typeface="Consolas" panose="020B0609020204030204" pitchFamily="49" charset="0"/>
+              </a:rPr>
+              <a:t>sync</a:t>
+            </a:r>
+            <a:endParaRPr lang="fr-FR" dirty="0">
+              <a:latin typeface="Consolas" panose="020B0609020204030204" pitchFamily="49" charset="0"/>
+            </a:endParaRPr>
+          </a:p>
+          <a:p>
             <a:r>
               <a:rPr lang="fr-FR" dirty="0"/>
               <a:t>git </a:t>
@@ -28407,7 +28452,85 @@
           <a:p>
             <a:r>
               <a:rPr lang="fr-FR" dirty="0"/>
-              <a:t>git select		sélection d’un SKU</a:t>
+              <a:t>git select		sélection d’un </a:t>
+            </a:r>
+            <a:r>
+              <a:rPr lang="fr-FR" i="1" dirty="0"/>
+              <a:t>SKU</a:t>
+            </a:r>
+            <a:r>
+              <a:rPr lang="fr-FR" dirty="0"/>
+              <a:t> (</a:t>
+            </a:r>
+            <a:r>
+              <a:rPr lang="fr-FR" i="1" dirty="0"/>
+              <a:t>dev</a:t>
+            </a:r>
+            <a:r>
+              <a:rPr lang="fr-FR" dirty="0"/>
+              <a:t> ou </a:t>
+            </a:r>
+            <a:r>
+              <a:rPr lang="fr-FR" i="1" dirty="0"/>
+              <a:t>prod</a:t>
+            </a:r>
+            <a:r>
+              <a:rPr lang="fr-FR" dirty="0"/>
+              <a:t>)</a:t>
+            </a:r>
+          </a:p>
+          <a:p>
+            <a:pPr lvl="1"/>
+            <a:r>
+              <a:rPr lang="fr-FR" dirty="0" err="1">
+                <a:latin typeface="Consolas" panose="020B0609020204030204" pitchFamily="49" charset="0"/>
+              </a:rPr>
+              <a:t>cresus</a:t>
+            </a:r>
+            <a:r>
+              <a:rPr lang="fr-FR" dirty="0">
+                <a:latin typeface="Consolas" panose="020B0609020204030204" pitchFamily="49" charset="0"/>
+              </a:rPr>
+              <a:t>-dev&gt; git for git select </a:t>
+            </a:r>
+            <a:r>
+              <a:rPr lang="fr-FR" dirty="0" err="1">
+                <a:latin typeface="Consolas" panose="020B0609020204030204" pitchFamily="49" charset="0"/>
+              </a:rPr>
+              <a:t>sku</a:t>
+            </a:r>
+            <a:r>
+              <a:rPr lang="fr-FR" dirty="0">
+                <a:latin typeface="Consolas" panose="020B0609020204030204" pitchFamily="49" charset="0"/>
+              </a:rPr>
+              <a:t>/sal/dev</a:t>
+            </a:r>
+          </a:p>
+          <a:p>
+            <a:pPr lvl="1"/>
+            <a:r>
+              <a:rPr lang="fr-FR" dirty="0" err="1">
+                <a:latin typeface="Consolas" panose="020B0609020204030204" pitchFamily="49" charset="0"/>
+              </a:rPr>
+              <a:t>cresus</a:t>
+            </a:r>
+            <a:r>
+              <a:rPr lang="fr-FR" dirty="0">
+                <a:latin typeface="Consolas" panose="020B0609020204030204" pitchFamily="49" charset="0"/>
+              </a:rPr>
+              <a:t>-dev&gt; git for git select </a:t>
+            </a:r>
+            <a:r>
+              <a:rPr lang="fr-FR" dirty="0" err="1">
+                <a:latin typeface="Consolas" panose="020B0609020204030204" pitchFamily="49" charset="0"/>
+              </a:rPr>
+              <a:t>sku</a:t>
+            </a:r>
+            <a:r>
+              <a:rPr lang="fr-FR" dirty="0">
+                <a:latin typeface="Consolas" panose="020B0609020204030204" pitchFamily="49" charset="0"/>
+              </a:rPr>
+              <a:t>/sal/13.1</a:t>
             </a:r>
           </a:p>
           <a:p>
@@ -28434,6 +28557,13 @@
             <a:r>
               <a:rPr lang="fr-FR" i="1" dirty="0"/>
               <a:t>prod</a:t>
+            </a:r>
+          </a:p>
+          <a:p>
+            <a:pPr lvl="1"/>
+            <a:r>
+              <a:rPr lang="fr-FR" i="1" dirty="0"/>
+              <a:t>en construction</a:t>
             </a:r>
           </a:p>
           <a:p>
@@ -28473,7 +28603,13 @@
       </p:grpSpPr>
       <p:sp>
         <p:nvSpPr>
-          <p:cNvPr id="2" name="Titre 1"/>
+          <p:cNvPr id="2" name="Titre 1">
+            <a:extLst>
+              <a:ext uri="{FF2B5EF4-FFF2-40B4-BE49-F238E27FC236}">
+                <a16:creationId xmlns:a16="http://schemas.microsoft.com/office/drawing/2014/main" id="{BCF66089-D28B-49E7-A846-8CAFD0D650FA}"/>
+              </a:ext>
+            </a:extLst>
+          </p:cNvPr>
           <p:cNvSpPr>
             <a:spLocks noGrp="1"/>
           </p:cNvSpPr>
@@ -28487,51 +28623,20 @@
           <a:lstStyle/>
           <a:p>
             <a:r>
-              <a:rPr lang="fr-CH" dirty="0">
-                <a:latin typeface="Consolas" panose="020B0609020204030204" pitchFamily="49" charset="0"/>
-              </a:rPr>
-              <a:t>git for </a:t>
-            </a:r>
-            <a:r>
               <a:rPr lang="fr-CH" dirty="0"/>
-              <a:t>– la boucle d’exécution </a:t>
-            </a:r>
-            <a:endParaRPr lang="fr-FR" dirty="0"/>
-          </a:p>
-        </p:txBody>
-      </p:sp>
-      <p:sp>
-        <p:nvSpPr>
-          <p:cNvPr id="3" name="Espace réservé du contenu 2"/>
-          <p:cNvSpPr>
-            <a:spLocks noGrp="1"/>
-          </p:cNvSpPr>
-          <p:nvPr>
-            <p:ph idx="1"/>
-          </p:nvPr>
-        </p:nvSpPr>
-        <p:spPr/>
-        <p:txBody>
-          <a:bodyPr/>
-          <a:lstStyle/>
-          <a:p>
-            <a:r>
+              <a:t>Des questions ?</a:t>
+            </a:r>
+            <a:br>
               <a:rPr lang="fr-CH" dirty="0"/>
-              <a:t>Permet d’exécuter une commande dans les divers dépôts d’un bundle</a:t>
-            </a:r>
-          </a:p>
-          <a:p>
-            <a:r>
-              <a:rPr lang="fr-CH" dirty="0"/>
-              <a:t>Diverses options permettent de contrôler quels dépôts sont visités</a:t>
-            </a:r>
+            </a:br>
+            <a:endParaRPr lang="en-US" dirty="0"/>
           </a:p>
         </p:txBody>
       </p:sp>
     </p:spTree>
     <p:extLst>
       <p:ext uri="{BB962C8B-B14F-4D97-AF65-F5344CB8AC3E}">
-        <p14:creationId xmlns:p14="http://schemas.microsoft.com/office/powerpoint/2010/main" val="1619784935"/>
+        <p14:creationId xmlns:p14="http://schemas.microsoft.com/office/powerpoint/2010/main" val="2720761628"/>
       </p:ext>
     </p:extLst>
   </p:cSld>
@@ -28574,16 +28679,14 @@
           <a:lstStyle/>
           <a:p>
             <a:r>
+              <a:rPr lang="fr-CH" dirty="0">
+                <a:latin typeface="Consolas" panose="020B0609020204030204" pitchFamily="49" charset="0"/>
+              </a:rPr>
+              <a:t>git for </a:t>
+            </a:r>
+            <a:r>
               <a:rPr lang="fr-CH" dirty="0"/>
-              <a:t>git </a:t>
-            </a:r>
-            <a:r>
-              <a:rPr lang="fr-CH" dirty="0" err="1"/>
-              <a:t>sync</a:t>
-            </a:r>
-            <a:r>
-              <a:rPr lang="fr-CH" dirty="0"/>
-              <a:t> – faciliter la synchronisation</a:t>
+              <a:t>– la boucle d’exécution </a:t>
             </a:r>
             <a:endParaRPr lang="fr-FR" dirty="0"/>
           </a:p>
@@ -28604,14 +28707,23 @@
           <a:bodyPr/>
           <a:lstStyle/>
           <a:p>
-            <a:endParaRPr lang="fr-FR" dirty="0"/>
+            <a:r>
+              <a:rPr lang="fr-CH" dirty="0"/>
+              <a:t>Permet d’exécuter une commande dans les divers dépôts d’un bundle</a:t>
+            </a:r>
+          </a:p>
+          <a:p>
+            <a:r>
+              <a:rPr lang="fr-CH" dirty="0"/>
+              <a:t>Diverses options permettent de contrôler quels dépôts sont visités</a:t>
+            </a:r>
           </a:p>
         </p:txBody>
       </p:sp>
     </p:spTree>
     <p:extLst>
       <p:ext uri="{BB962C8B-B14F-4D97-AF65-F5344CB8AC3E}">
-        <p14:creationId xmlns:p14="http://schemas.microsoft.com/office/powerpoint/2010/main" val="1906860434"/>
+        <p14:creationId xmlns:p14="http://schemas.microsoft.com/office/powerpoint/2010/main" val="1619784935"/>
       </p:ext>
     </p:extLst>
   </p:cSld>
@@ -28655,6 +28767,86 @@
           <a:p>
             <a:r>
               <a:rPr lang="fr-CH" dirty="0"/>
+              <a:t>git </a:t>
+            </a:r>
+            <a:r>
+              <a:rPr lang="fr-CH" dirty="0" err="1"/>
+              <a:t>sync</a:t>
+            </a:r>
+            <a:r>
+              <a:rPr lang="fr-CH" dirty="0"/>
+              <a:t> – faciliter la synchronisation</a:t>
+            </a:r>
+            <a:endParaRPr lang="fr-FR" dirty="0"/>
+          </a:p>
+        </p:txBody>
+      </p:sp>
+      <p:sp>
+        <p:nvSpPr>
+          <p:cNvPr id="3" name="Espace réservé du contenu 2"/>
+          <p:cNvSpPr>
+            <a:spLocks noGrp="1"/>
+          </p:cNvSpPr>
+          <p:nvPr>
+            <p:ph idx="1"/>
+          </p:nvPr>
+        </p:nvSpPr>
+        <p:spPr/>
+        <p:txBody>
+          <a:bodyPr/>
+          <a:lstStyle/>
+          <a:p>
+            <a:endParaRPr lang="fr-FR" dirty="0"/>
+          </a:p>
+        </p:txBody>
+      </p:sp>
+    </p:spTree>
+    <p:extLst>
+      <p:ext uri="{BB962C8B-B14F-4D97-AF65-F5344CB8AC3E}">
+        <p14:creationId xmlns:p14="http://schemas.microsoft.com/office/powerpoint/2010/main" val="1906860434"/>
+      </p:ext>
+    </p:extLst>
+  </p:cSld>
+  <p:clrMapOvr>
+    <a:masterClrMapping/>
+  </p:clrMapOvr>
+</p:sld>
+</file>
+
+<file path=ppt/slides/slide28.xml><?xml version="1.0" encoding="utf-8"?>
+<p:sld xmlns:a="http://schemas.openxmlformats.org/drawingml/2006/main" xmlns:r="http://schemas.openxmlformats.org/officeDocument/2006/relationships" xmlns:p="http://schemas.openxmlformats.org/presentationml/2006/main">
+  <p:cSld>
+    <p:spTree>
+      <p:nvGrpSpPr>
+        <p:cNvPr id="1" name=""/>
+        <p:cNvGrpSpPr/>
+        <p:nvPr/>
+      </p:nvGrpSpPr>
+      <p:grpSpPr>
+        <a:xfrm>
+          <a:off x="0" y="0"/>
+          <a:ext cx="0" cy="0"/>
+          <a:chOff x="0" y="0"/>
+          <a:chExt cx="0" cy="0"/>
+        </a:xfrm>
+      </p:grpSpPr>
+      <p:sp>
+        <p:nvSpPr>
+          <p:cNvPr id="2" name="Titre 1"/>
+          <p:cNvSpPr>
+            <a:spLocks noGrp="1"/>
+          </p:cNvSpPr>
+          <p:nvPr>
+            <p:ph type="title"/>
+          </p:nvPr>
+        </p:nvSpPr>
+        <p:spPr/>
+        <p:txBody>
+          <a:bodyPr/>
+          <a:lstStyle/>
+          <a:p>
+            <a:r>
+              <a:rPr lang="fr-CH" dirty="0"/>
               <a:t>git – petite nomenclature</a:t>
             </a:r>
             <a:endParaRPr lang="fr-FR" dirty="0"/>
@@ -28739,7 +28931,7 @@
 </p:sld>
 </file>
 
-<file path=ppt/slides/slide28.xml><?xml version="1.0" encoding="utf-8"?>
+<file path=ppt/slides/slide29.xml><?xml version="1.0" encoding="utf-8"?>
 <p:sld xmlns:a="http://schemas.openxmlformats.org/drawingml/2006/main" xmlns:r="http://schemas.openxmlformats.org/officeDocument/2006/relationships" xmlns:p="http://schemas.openxmlformats.org/presentationml/2006/main">
   <p:cSld>
     <p:spTree>
@@ -29856,7 +30048,145 @@
 </p:sld>
 </file>
 
-<file path=ppt/slides/slide29.xml><?xml version="1.0" encoding="utf-8"?>
+<file path=ppt/slides/slide3.xml><?xml version="1.0" encoding="utf-8"?>
+<p:sld xmlns:a="http://schemas.openxmlformats.org/drawingml/2006/main" xmlns:r="http://schemas.openxmlformats.org/officeDocument/2006/relationships" xmlns:p="http://schemas.openxmlformats.org/presentationml/2006/main">
+  <p:cSld>
+    <p:spTree>
+      <p:nvGrpSpPr>
+        <p:cNvPr id="1" name=""/>
+        <p:cNvGrpSpPr/>
+        <p:nvPr/>
+      </p:nvGrpSpPr>
+      <p:grpSpPr>
+        <a:xfrm>
+          <a:off x="0" y="0"/>
+          <a:ext cx="0" cy="0"/>
+          <a:chOff x="0" y="0"/>
+          <a:chExt cx="0" cy="0"/>
+        </a:xfrm>
+      </p:grpSpPr>
+      <p:sp>
+        <p:nvSpPr>
+          <p:cNvPr id="2" name="Titre 1"/>
+          <p:cNvSpPr>
+            <a:spLocks noGrp="1"/>
+          </p:cNvSpPr>
+          <p:nvPr>
+            <p:ph type="title"/>
+          </p:nvPr>
+        </p:nvSpPr>
+        <p:spPr/>
+        <p:txBody>
+          <a:bodyPr/>
+          <a:lstStyle/>
+          <a:p>
+            <a:r>
+              <a:rPr lang="fr-CH" noProof="0" dirty="0"/>
+              <a:t>Ligne de production</a:t>
+            </a:r>
+            <a:endParaRPr lang="fr-FR" noProof="0" dirty="0"/>
+          </a:p>
+        </p:txBody>
+      </p:sp>
+      <p:sp>
+        <p:nvSpPr>
+          <p:cNvPr id="3" name="Espace réservé du contenu 2"/>
+          <p:cNvSpPr>
+            <a:spLocks noGrp="1"/>
+          </p:cNvSpPr>
+          <p:nvPr>
+            <p:ph idx="1"/>
+          </p:nvPr>
+        </p:nvSpPr>
+        <p:spPr>
+          <a:xfrm>
+            <a:off x="2589212" y="2133600"/>
+            <a:ext cx="8915400" cy="1421732"/>
+          </a:xfrm>
+        </p:spPr>
+        <p:txBody>
+          <a:bodyPr>
+            <a:normAutofit/>
+          </a:bodyPr>
+          <a:lstStyle/>
+          <a:p>
+            <a:r>
+              <a:rPr lang="fr-FR" noProof="0" dirty="0"/>
+              <a:t>En entrée des contributeurs, des idées, du code…</a:t>
+            </a:r>
+            <a:endParaRPr lang="fr-FR" i="1" dirty="0"/>
+          </a:p>
+          <a:p>
+            <a:r>
+              <a:rPr lang="fr-FR" dirty="0"/>
+              <a:t>En sortie des </a:t>
+            </a:r>
+            <a:r>
+              <a:rPr lang="fr-FR" b="1" dirty="0" err="1"/>
+              <a:t>SKU</a:t>
+            </a:r>
+            <a:r>
+              <a:rPr lang="fr-FR" dirty="0" err="1"/>
+              <a:t>s</a:t>
+            </a:r>
+            <a:r>
+              <a:rPr lang="fr-FR" dirty="0"/>
+              <a:t> ou unités de gestion des stocks (</a:t>
+            </a:r>
+            <a:r>
+              <a:rPr lang="fr-FR" b="1" i="1" dirty="0"/>
+              <a:t>S</a:t>
+            </a:r>
+            <a:r>
+              <a:rPr lang="fr-FR" i="1" dirty="0"/>
+              <a:t>tock </a:t>
+            </a:r>
+            <a:r>
+              <a:rPr lang="fr-FR" b="1" i="1" dirty="0" err="1"/>
+              <a:t>K</a:t>
+            </a:r>
+            <a:r>
+              <a:rPr lang="fr-FR" i="1" dirty="0" err="1"/>
+              <a:t>eeping</a:t>
+            </a:r>
+            <a:r>
+              <a:rPr lang="fr-FR" i="1" dirty="0"/>
+              <a:t> </a:t>
+            </a:r>
+            <a:r>
+              <a:rPr lang="fr-FR" b="1" i="1" dirty="0"/>
+              <a:t>U</a:t>
+            </a:r>
+            <a:r>
+              <a:rPr lang="fr-FR" i="1" dirty="0"/>
+              <a:t>nit)	</a:t>
+            </a:r>
+          </a:p>
+          <a:p>
+            <a:endParaRPr lang="fr-FR" dirty="0"/>
+          </a:p>
+          <a:p>
+            <a:pPr marL="0" indent="0">
+              <a:buNone/>
+            </a:pPr>
+            <a:endParaRPr lang="fr-FR" noProof="0" dirty="0"/>
+          </a:p>
+        </p:txBody>
+      </p:sp>
+    </p:spTree>
+    <p:extLst>
+      <p:ext uri="{BB962C8B-B14F-4D97-AF65-F5344CB8AC3E}">
+        <p14:creationId xmlns:p14="http://schemas.microsoft.com/office/powerpoint/2010/main" val="2156645168"/>
+      </p:ext>
+    </p:extLst>
+  </p:cSld>
+  <p:clrMapOvr>
+    <a:masterClrMapping/>
+  </p:clrMapOvr>
+</p:sld>
+</file>
+
+<file path=ppt/slides/slide30.xml><?xml version="1.0" encoding="utf-8"?>
 <p:sld xmlns:a="http://schemas.openxmlformats.org/drawingml/2006/main" xmlns:r="http://schemas.openxmlformats.org/officeDocument/2006/relationships" xmlns:p="http://schemas.openxmlformats.org/presentationml/2006/main">
   <p:cSld>
     <p:spTree>
@@ -30306,145 +30636,7 @@
 </p:sld>
 </file>
 
-<file path=ppt/slides/slide3.xml><?xml version="1.0" encoding="utf-8"?>
-<p:sld xmlns:a="http://schemas.openxmlformats.org/drawingml/2006/main" xmlns:r="http://schemas.openxmlformats.org/officeDocument/2006/relationships" xmlns:p="http://schemas.openxmlformats.org/presentationml/2006/main">
-  <p:cSld>
-    <p:spTree>
-      <p:nvGrpSpPr>
-        <p:cNvPr id="1" name=""/>
-        <p:cNvGrpSpPr/>
-        <p:nvPr/>
-      </p:nvGrpSpPr>
-      <p:grpSpPr>
-        <a:xfrm>
-          <a:off x="0" y="0"/>
-          <a:ext cx="0" cy="0"/>
-          <a:chOff x="0" y="0"/>
-          <a:chExt cx="0" cy="0"/>
-        </a:xfrm>
-      </p:grpSpPr>
-      <p:sp>
-        <p:nvSpPr>
-          <p:cNvPr id="2" name="Titre 1"/>
-          <p:cNvSpPr>
-            <a:spLocks noGrp="1"/>
-          </p:cNvSpPr>
-          <p:nvPr>
-            <p:ph type="title"/>
-          </p:nvPr>
-        </p:nvSpPr>
-        <p:spPr/>
-        <p:txBody>
-          <a:bodyPr/>
-          <a:lstStyle/>
-          <a:p>
-            <a:r>
-              <a:rPr lang="fr-CH" noProof="0" dirty="0"/>
-              <a:t>Ligne de production</a:t>
-            </a:r>
-            <a:endParaRPr lang="fr-FR" noProof="0" dirty="0"/>
-          </a:p>
-        </p:txBody>
-      </p:sp>
-      <p:sp>
-        <p:nvSpPr>
-          <p:cNvPr id="3" name="Espace réservé du contenu 2"/>
-          <p:cNvSpPr>
-            <a:spLocks noGrp="1"/>
-          </p:cNvSpPr>
-          <p:nvPr>
-            <p:ph idx="1"/>
-          </p:nvPr>
-        </p:nvSpPr>
-        <p:spPr>
-          <a:xfrm>
-            <a:off x="2589212" y="2133600"/>
-            <a:ext cx="8915400" cy="1421732"/>
-          </a:xfrm>
-        </p:spPr>
-        <p:txBody>
-          <a:bodyPr>
-            <a:normAutofit/>
-          </a:bodyPr>
-          <a:lstStyle/>
-          <a:p>
-            <a:r>
-              <a:rPr lang="fr-FR" noProof="0" dirty="0"/>
-              <a:t>En entrée des contributeurs, des idées, du code…</a:t>
-            </a:r>
-            <a:endParaRPr lang="fr-FR" i="1" dirty="0"/>
-          </a:p>
-          <a:p>
-            <a:r>
-              <a:rPr lang="fr-FR" dirty="0"/>
-              <a:t>En sortie des </a:t>
-            </a:r>
-            <a:r>
-              <a:rPr lang="fr-FR" b="1" dirty="0" err="1"/>
-              <a:t>SKU</a:t>
-            </a:r>
-            <a:r>
-              <a:rPr lang="fr-FR" dirty="0" err="1"/>
-              <a:t>s</a:t>
-            </a:r>
-            <a:r>
-              <a:rPr lang="fr-FR" dirty="0"/>
-              <a:t> ou unités de gestion des stocks (</a:t>
-            </a:r>
-            <a:r>
-              <a:rPr lang="fr-FR" b="1" i="1" dirty="0"/>
-              <a:t>S</a:t>
-            </a:r>
-            <a:r>
-              <a:rPr lang="fr-FR" i="1" dirty="0"/>
-              <a:t>tock </a:t>
-            </a:r>
-            <a:r>
-              <a:rPr lang="fr-FR" b="1" i="1" dirty="0" err="1"/>
-              <a:t>K</a:t>
-            </a:r>
-            <a:r>
-              <a:rPr lang="fr-FR" i="1" dirty="0" err="1"/>
-              <a:t>eeping</a:t>
-            </a:r>
-            <a:r>
-              <a:rPr lang="fr-FR" i="1" dirty="0"/>
-              <a:t> </a:t>
-            </a:r>
-            <a:r>
-              <a:rPr lang="fr-FR" b="1" i="1" dirty="0"/>
-              <a:t>U</a:t>
-            </a:r>
-            <a:r>
-              <a:rPr lang="fr-FR" i="1" dirty="0"/>
-              <a:t>nit)	</a:t>
-            </a:r>
-          </a:p>
-          <a:p>
-            <a:endParaRPr lang="fr-FR" dirty="0"/>
-          </a:p>
-          <a:p>
-            <a:pPr marL="0" indent="0">
-              <a:buNone/>
-            </a:pPr>
-            <a:endParaRPr lang="fr-FR" noProof="0" dirty="0"/>
-          </a:p>
-        </p:txBody>
-      </p:sp>
-    </p:spTree>
-    <p:extLst>
-      <p:ext uri="{BB962C8B-B14F-4D97-AF65-F5344CB8AC3E}">
-        <p14:creationId xmlns:p14="http://schemas.microsoft.com/office/powerpoint/2010/main" val="2156645168"/>
-      </p:ext>
-    </p:extLst>
-  </p:cSld>
-  <p:clrMapOvr>
-    <a:masterClrMapping/>
-  </p:clrMapOvr>
-</p:sld>
-</file>
-
-<file path=ppt/slides/slide30.xml><?xml version="1.0" encoding="utf-8"?>
+<file path=ppt/slides/slide31.xml><?xml version="1.0" encoding="utf-8"?>
 <p:sld xmlns:a="http://schemas.openxmlformats.org/drawingml/2006/main" xmlns:r="http://schemas.openxmlformats.org/officeDocument/2006/relationships" xmlns:p="http://schemas.openxmlformats.org/presentationml/2006/main">
   <p:cSld>
     <p:spTree>

</xml_diff>